<commit_message>
added slides for site description
</commit_message>
<xml_diff>
--- a/Documents/Présentation.pptx
+++ b/Documents/Présentation.pptx
@@ -6,9 +6,14 @@
   </p:sldMasterIdLst>
   <p:sldIdLst>
     <p:sldId id="256" r:id="rId2"/>
-    <p:sldId id="258" r:id="rId3"/>
-    <p:sldId id="259" r:id="rId4"/>
-    <p:sldId id="257" r:id="rId5"/>
+    <p:sldId id="261" r:id="rId3"/>
+    <p:sldId id="260" r:id="rId4"/>
+    <p:sldId id="262" r:id="rId5"/>
+    <p:sldId id="263" r:id="rId6"/>
+    <p:sldId id="264" r:id="rId7"/>
+    <p:sldId id="258" r:id="rId8"/>
+    <p:sldId id="259" r:id="rId9"/>
+    <p:sldId id="257" r:id="rId10"/>
   </p:sldIdLst>
   <p:sldSz cx="9144000" cy="6858000" type="screen4x3"/>
   <p:notesSz cx="6858000" cy="9144000"/>
@@ -296,7 +301,7 @@
           <a:p>
             <a:fld id="{70BA1CFD-BFF0-48BC-9BA5-4974D7A6AB15}" type="datetimeFigureOut">
               <a:rPr lang="en-US" smtClean="0"/>
-              <a:t>15-04-05</a:t>
+              <a:t>15-04-09</a:t>
             </a:fld>
             <a:endParaRPr lang="en-US"/>
           </a:p>
@@ -653,7 +658,7 @@
           <a:p>
             <a:fld id="{70BA1CFD-BFF0-48BC-9BA5-4974D7A6AB15}" type="datetimeFigureOut">
               <a:rPr lang="en-US" smtClean="0"/>
-              <a:t>15-04-05</a:t>
+              <a:t>15-04-09</a:t>
             </a:fld>
             <a:endParaRPr lang="en-US"/>
           </a:p>
@@ -822,7 +827,7 @@
           <a:p>
             <a:fld id="{70BA1CFD-BFF0-48BC-9BA5-4974D7A6AB15}" type="datetimeFigureOut">
               <a:rPr lang="en-US" smtClean="0"/>
-              <a:t>15-04-05</a:t>
+              <a:t>15-04-09</a:t>
             </a:fld>
             <a:endParaRPr lang="en-US"/>
           </a:p>
@@ -1001,7 +1006,7 @@
           <a:p>
             <a:fld id="{70BA1CFD-BFF0-48BC-9BA5-4974D7A6AB15}" type="datetimeFigureOut">
               <a:rPr lang="en-US" smtClean="0"/>
-              <a:t>15-04-05</a:t>
+              <a:t>15-04-09</a:t>
             </a:fld>
             <a:endParaRPr lang="en-US"/>
           </a:p>
@@ -1170,7 +1175,7 @@
           <a:p>
             <a:fld id="{70BA1CFD-BFF0-48BC-9BA5-4974D7A6AB15}" type="datetimeFigureOut">
               <a:rPr lang="en-US" smtClean="0"/>
-              <a:t>15-04-05</a:t>
+              <a:t>15-04-09</a:t>
             </a:fld>
             <a:endParaRPr lang="en-US"/>
           </a:p>
@@ -1447,7 +1452,7 @@
           <a:p>
             <a:fld id="{70BA1CFD-BFF0-48BC-9BA5-4974D7A6AB15}" type="datetimeFigureOut">
               <a:rPr lang="en-US" smtClean="0"/>
-              <a:t>15-04-05</a:t>
+              <a:t>15-04-09</a:t>
             </a:fld>
             <a:endParaRPr lang="en-US"/>
           </a:p>
@@ -1739,7 +1744,7 @@
           <a:p>
             <a:fld id="{70BA1CFD-BFF0-48BC-9BA5-4974D7A6AB15}" type="datetimeFigureOut">
               <a:rPr lang="en-US" smtClean="0"/>
-              <a:t>15-04-05</a:t>
+              <a:t>15-04-09</a:t>
             </a:fld>
             <a:endParaRPr lang="en-US"/>
           </a:p>
@@ -2175,7 +2180,7 @@
           <a:p>
             <a:fld id="{70BA1CFD-BFF0-48BC-9BA5-4974D7A6AB15}" type="datetimeFigureOut">
               <a:rPr lang="en-US" smtClean="0"/>
-              <a:t>15-04-05</a:t>
+              <a:t>15-04-09</a:t>
             </a:fld>
             <a:endParaRPr lang="en-US"/>
           </a:p>
@@ -2288,7 +2293,7 @@
           <a:p>
             <a:fld id="{70BA1CFD-BFF0-48BC-9BA5-4974D7A6AB15}" type="datetimeFigureOut">
               <a:rPr lang="en-US" smtClean="0"/>
-              <a:t>15-04-05</a:t>
+              <a:t>15-04-09</a:t>
             </a:fld>
             <a:endParaRPr lang="en-US"/>
           </a:p>
@@ -2378,7 +2383,7 @@
           <a:p>
             <a:fld id="{70BA1CFD-BFF0-48BC-9BA5-4974D7A6AB15}" type="datetimeFigureOut">
               <a:rPr lang="en-US" smtClean="0"/>
-              <a:t>15-04-05</a:t>
+              <a:t>15-04-09</a:t>
             </a:fld>
             <a:endParaRPr lang="en-US"/>
           </a:p>
@@ -2715,7 +2720,7 @@
           <a:p>
             <a:fld id="{70BA1CFD-BFF0-48BC-9BA5-4974D7A6AB15}" type="datetimeFigureOut">
               <a:rPr lang="en-US" smtClean="0"/>
-              <a:t>15-04-05</a:t>
+              <a:t>15-04-09</a:t>
             </a:fld>
             <a:endParaRPr lang="en-US"/>
           </a:p>
@@ -3030,7 +3035,7 @@
           <a:p>
             <a:fld id="{70BA1CFD-BFF0-48BC-9BA5-4974D7A6AB15}" type="datetimeFigureOut">
               <a:rPr lang="en-US" smtClean="0"/>
-              <a:t>15-04-05</a:t>
+              <a:t>15-04-09</a:t>
             </a:fld>
             <a:endParaRPr lang="en-US"/>
           </a:p>
@@ -3276,7 +3281,7 @@
           <a:p>
             <a:fld id="{70BA1CFD-BFF0-48BC-9BA5-4974D7A6AB15}" type="datetimeFigureOut">
               <a:rPr lang="en-US" smtClean="0"/>
-              <a:t>15-04-05</a:t>
+              <a:t>15-04-09</a:t>
             </a:fld>
             <a:endParaRPr lang="en-US"/>
           </a:p>
@@ -3764,7 +3769,10 @@
           <a:bodyPr/>
           <a:lstStyle/>
           <a:p>
-            <a:endParaRPr lang="en-US"/>
+            <a:r>
+              <a:rPr lang="en-US"/>
+              <a:t>Clinique Médicale Angus</a:t>
+            </a:r>
           </a:p>
         </p:txBody>
       </p:sp>
@@ -3780,10 +3788,30 @@
         </p:nvSpPr>
         <p:spPr/>
         <p:txBody>
-          <a:bodyPr/>
-          <a:lstStyle/>
-          <a:p>
-            <a:endParaRPr lang="en-US"/>
+          <a:bodyPr anchor="b">
+            <a:normAutofit/>
+          </a:bodyPr>
+          <a:lstStyle/>
+          <a:p>
+            <a:pPr algn="r"/>
+            <a:r>
+              <a:rPr lang="en-US" sz="1600"/>
+              <a:t>Anna Pushkina</a:t>
+            </a:r>
+          </a:p>
+          <a:p>
+            <a:pPr algn="r"/>
+            <a:r>
+              <a:rPr lang="en-US" sz="1600"/>
+              <a:t>Danny Thibaudeau</a:t>
+            </a:r>
+          </a:p>
+          <a:p>
+            <a:pPr algn="r"/>
+            <a:r>
+              <a:rPr lang="en-US" sz="1600"/>
+              <a:t>Romary Ndamobissi</a:t>
+            </a:r>
           </a:p>
         </p:txBody>
       </p:sp>
@@ -3819,6 +3847,355 @@
       </p:grpSpPr>
       <p:sp>
         <p:nvSpPr>
+          <p:cNvPr id="2" name="Title 1"/>
+          <p:cNvSpPr>
+            <a:spLocks noGrp="1"/>
+          </p:cNvSpPr>
+          <p:nvPr>
+            <p:ph type="title"/>
+          </p:nvPr>
+        </p:nvSpPr>
+        <p:spPr/>
+        <p:txBody>
+          <a:bodyPr/>
+          <a:lstStyle/>
+          <a:p>
+            <a:r>
+              <a:rPr lang="en-US"/>
+              <a:t>Site actuel</a:t>
+            </a:r>
+          </a:p>
+        </p:txBody>
+      </p:sp>
+      <p:pic>
+        <p:nvPicPr>
+          <p:cNvPr id="4" name="Content Placeholder 3"/>
+          <p:cNvPicPr>
+            <a:picLocks noGrp="1" noChangeAspect="1"/>
+          </p:cNvPicPr>
+          <p:nvPr>
+            <p:ph idx="1"/>
+          </p:nvPr>
+        </p:nvPicPr>
+        <p:blipFill rotWithShape="1">
+          <a:blip r:embed="rId2"/>
+          <a:srcRect l="-47743" r="-47814" b="-2"/>
+          <a:stretch/>
+        </p:blipFill>
+        <p:spPr/>
+      </p:pic>
+    </p:spTree>
+    <p:extLst>
+      <p:ext uri="{BB962C8B-B14F-4D97-AF65-F5344CB8AC3E}">
+        <p14:creationId xmlns:p14="http://schemas.microsoft.com/office/powerpoint/2010/main" val="916259273"/>
+      </p:ext>
+    </p:extLst>
+  </p:cSld>
+  <p:clrMapOvr>
+    <a:masterClrMapping/>
+  </p:clrMapOvr>
+</p:sld>
+</file>
+
+<file path=ppt/slides/slide3.xml><?xml version="1.0" encoding="utf-8"?>
+<p:sld xmlns:a="http://schemas.openxmlformats.org/drawingml/2006/main" xmlns:r="http://schemas.openxmlformats.org/officeDocument/2006/relationships" xmlns:p="http://schemas.openxmlformats.org/presentationml/2006/main">
+  <p:cSld>
+    <p:spTree>
+      <p:nvGrpSpPr>
+        <p:cNvPr id="1" name=""/>
+        <p:cNvGrpSpPr/>
+        <p:nvPr/>
+      </p:nvGrpSpPr>
+      <p:grpSpPr>
+        <a:xfrm>
+          <a:off x="0" y="0"/>
+          <a:ext cx="0" cy="0"/>
+          <a:chOff x="0" y="0"/>
+          <a:chExt cx="0" cy="0"/>
+        </a:xfrm>
+      </p:grpSpPr>
+      <p:sp>
+        <p:nvSpPr>
+          <p:cNvPr id="2" name="Title 1"/>
+          <p:cNvSpPr>
+            <a:spLocks noGrp="1"/>
+          </p:cNvSpPr>
+          <p:nvPr>
+            <p:ph type="title"/>
+          </p:nvPr>
+        </p:nvSpPr>
+        <p:spPr/>
+        <p:txBody>
+          <a:bodyPr/>
+          <a:lstStyle/>
+          <a:p>
+            <a:r>
+              <a:rPr lang="en-US"/>
+              <a:t>Page d’accueil</a:t>
+            </a:r>
+          </a:p>
+        </p:txBody>
+      </p:sp>
+      <p:pic>
+        <p:nvPicPr>
+          <p:cNvPr id="4" name="Content Placeholder 3"/>
+          <p:cNvPicPr>
+            <a:picLocks noGrp="1" noChangeAspect="1"/>
+          </p:cNvPicPr>
+          <p:nvPr>
+            <p:ph idx="1"/>
+          </p:nvPr>
+        </p:nvPicPr>
+        <p:blipFill rotWithShape="1">
+          <a:blip r:embed="rId2"/>
+          <a:srcRect l="-14452" r="-22907"/>
+          <a:stretch/>
+        </p:blipFill>
+        <p:spPr/>
+      </p:pic>
+    </p:spTree>
+    <p:extLst>
+      <p:ext uri="{BB962C8B-B14F-4D97-AF65-F5344CB8AC3E}">
+        <p14:creationId xmlns:p14="http://schemas.microsoft.com/office/powerpoint/2010/main" val="1990581521"/>
+      </p:ext>
+    </p:extLst>
+  </p:cSld>
+  <p:clrMapOvr>
+    <a:masterClrMapping/>
+  </p:clrMapOvr>
+</p:sld>
+</file>
+
+<file path=ppt/slides/slide4.xml><?xml version="1.0" encoding="utf-8"?>
+<p:sld xmlns:a="http://schemas.openxmlformats.org/drawingml/2006/main" xmlns:r="http://schemas.openxmlformats.org/officeDocument/2006/relationships" xmlns:p="http://schemas.openxmlformats.org/presentationml/2006/main">
+  <p:cSld>
+    <p:spTree>
+      <p:nvGrpSpPr>
+        <p:cNvPr id="1" name=""/>
+        <p:cNvGrpSpPr/>
+        <p:nvPr/>
+      </p:nvGrpSpPr>
+      <p:grpSpPr>
+        <a:xfrm>
+          <a:off x="0" y="0"/>
+          <a:ext cx="0" cy="0"/>
+          <a:chOff x="0" y="0"/>
+          <a:chExt cx="0" cy="0"/>
+        </a:xfrm>
+      </p:grpSpPr>
+      <p:sp>
+        <p:nvSpPr>
+          <p:cNvPr id="2" name="Title 1"/>
+          <p:cNvSpPr>
+            <a:spLocks noGrp="1"/>
+          </p:cNvSpPr>
+          <p:nvPr>
+            <p:ph type="title"/>
+          </p:nvPr>
+        </p:nvSpPr>
+        <p:spPr/>
+        <p:txBody>
+          <a:bodyPr/>
+          <a:lstStyle/>
+          <a:p>
+            <a:r>
+              <a:rPr lang="en-US"/>
+              <a:t>page des services</a:t>
+            </a:r>
+          </a:p>
+        </p:txBody>
+      </p:sp>
+      <p:pic>
+        <p:nvPicPr>
+          <p:cNvPr id="4" name="Content Placeholder 3"/>
+          <p:cNvPicPr>
+            <a:picLocks noGrp="1" noChangeAspect="1"/>
+          </p:cNvPicPr>
+          <p:nvPr>
+            <p:ph idx="1"/>
+          </p:nvPr>
+        </p:nvPicPr>
+        <p:blipFill rotWithShape="1">
+          <a:blip r:embed="rId2"/>
+          <a:srcRect l="-13051" r="-15000" b="735"/>
+          <a:stretch/>
+        </p:blipFill>
+        <p:spPr/>
+      </p:pic>
+    </p:spTree>
+    <p:extLst>
+      <p:ext uri="{BB962C8B-B14F-4D97-AF65-F5344CB8AC3E}">
+        <p14:creationId xmlns:p14="http://schemas.microsoft.com/office/powerpoint/2010/main" val="4035296699"/>
+      </p:ext>
+    </p:extLst>
+  </p:cSld>
+  <p:clrMapOvr>
+    <a:masterClrMapping/>
+  </p:clrMapOvr>
+</p:sld>
+</file>
+
+<file path=ppt/slides/slide5.xml><?xml version="1.0" encoding="utf-8"?>
+<p:sld xmlns:a="http://schemas.openxmlformats.org/drawingml/2006/main" xmlns:r="http://schemas.openxmlformats.org/officeDocument/2006/relationships" xmlns:p="http://schemas.openxmlformats.org/presentationml/2006/main">
+  <p:cSld>
+    <p:spTree>
+      <p:nvGrpSpPr>
+        <p:cNvPr id="1" name=""/>
+        <p:cNvGrpSpPr/>
+        <p:nvPr/>
+      </p:nvGrpSpPr>
+      <p:grpSpPr>
+        <a:xfrm>
+          <a:off x="0" y="0"/>
+          <a:ext cx="0" cy="0"/>
+          <a:chOff x="0" y="0"/>
+          <a:chExt cx="0" cy="0"/>
+        </a:xfrm>
+      </p:grpSpPr>
+      <p:sp>
+        <p:nvSpPr>
+          <p:cNvPr id="2" name="Title 1"/>
+          <p:cNvSpPr>
+            <a:spLocks noGrp="1"/>
+          </p:cNvSpPr>
+          <p:nvPr>
+            <p:ph type="title"/>
+          </p:nvPr>
+        </p:nvSpPr>
+        <p:spPr/>
+        <p:txBody>
+          <a:bodyPr/>
+          <a:lstStyle/>
+          <a:p>
+            <a:r>
+              <a:rPr lang="en-US"/>
+              <a:t>page des services</a:t>
+            </a:r>
+          </a:p>
+        </p:txBody>
+      </p:sp>
+      <p:pic>
+        <p:nvPicPr>
+          <p:cNvPr id="4" name="Content Placeholder 3"/>
+          <p:cNvPicPr>
+            <a:picLocks noGrp="1" noChangeAspect="1"/>
+          </p:cNvPicPr>
+          <p:nvPr>
+            <p:ph idx="1"/>
+          </p:nvPr>
+        </p:nvPicPr>
+        <p:blipFill>
+          <a:blip r:embed="rId2"/>
+          <a:srcRect t="9576" b="9576"/>
+          <a:stretch>
+            <a:fillRect/>
+          </a:stretch>
+        </p:blipFill>
+        <p:spPr/>
+      </p:pic>
+    </p:spTree>
+    <p:extLst>
+      <p:ext uri="{BB962C8B-B14F-4D97-AF65-F5344CB8AC3E}">
+        <p14:creationId xmlns:p14="http://schemas.microsoft.com/office/powerpoint/2010/main" val="2489966998"/>
+      </p:ext>
+    </p:extLst>
+  </p:cSld>
+  <p:clrMapOvr>
+    <a:masterClrMapping/>
+  </p:clrMapOvr>
+</p:sld>
+</file>
+
+<file path=ppt/slides/slide6.xml><?xml version="1.0" encoding="utf-8"?>
+<p:sld xmlns:a="http://schemas.openxmlformats.org/drawingml/2006/main" xmlns:r="http://schemas.openxmlformats.org/officeDocument/2006/relationships" xmlns:p="http://schemas.openxmlformats.org/presentationml/2006/main">
+  <p:cSld>
+    <p:spTree>
+      <p:nvGrpSpPr>
+        <p:cNvPr id="1" name=""/>
+        <p:cNvGrpSpPr/>
+        <p:nvPr/>
+      </p:nvGrpSpPr>
+      <p:grpSpPr>
+        <a:xfrm>
+          <a:off x="0" y="0"/>
+          <a:ext cx="0" cy="0"/>
+          <a:chOff x="0" y="0"/>
+          <a:chExt cx="0" cy="0"/>
+        </a:xfrm>
+      </p:grpSpPr>
+      <p:sp>
+        <p:nvSpPr>
+          <p:cNvPr id="2" name="Title 1"/>
+          <p:cNvSpPr>
+            <a:spLocks noGrp="1"/>
+          </p:cNvSpPr>
+          <p:nvPr>
+            <p:ph type="title"/>
+          </p:nvPr>
+        </p:nvSpPr>
+        <p:spPr/>
+        <p:txBody>
+          <a:bodyPr/>
+          <a:lstStyle/>
+          <a:p>
+            <a:r>
+              <a:rPr lang="en-US"/>
+              <a:t>Page de l’équipe</a:t>
+            </a:r>
+          </a:p>
+        </p:txBody>
+      </p:sp>
+      <p:pic>
+        <p:nvPicPr>
+          <p:cNvPr id="4" name="Content Placeholder 3"/>
+          <p:cNvPicPr>
+            <a:picLocks noGrp="1" noChangeAspect="1"/>
+          </p:cNvPicPr>
+          <p:nvPr>
+            <p:ph idx="1"/>
+          </p:nvPr>
+        </p:nvPicPr>
+        <p:blipFill>
+          <a:blip r:embed="rId2"/>
+          <a:srcRect l="1374" r="1374"/>
+          <a:stretch>
+            <a:fillRect/>
+          </a:stretch>
+        </p:blipFill>
+        <p:spPr/>
+      </p:pic>
+    </p:spTree>
+    <p:extLst>
+      <p:ext uri="{BB962C8B-B14F-4D97-AF65-F5344CB8AC3E}">
+        <p14:creationId xmlns:p14="http://schemas.microsoft.com/office/powerpoint/2010/main" val="4165168025"/>
+      </p:ext>
+    </p:extLst>
+  </p:cSld>
+  <p:clrMapOvr>
+    <a:masterClrMapping/>
+  </p:clrMapOvr>
+</p:sld>
+</file>
+
+<file path=ppt/slides/slide7.xml><?xml version="1.0" encoding="utf-8"?>
+<p:sld xmlns:a="http://schemas.openxmlformats.org/drawingml/2006/main" xmlns:r="http://schemas.openxmlformats.org/officeDocument/2006/relationships" xmlns:p="http://schemas.openxmlformats.org/presentationml/2006/main">
+  <p:cSld>
+    <p:spTree>
+      <p:nvGrpSpPr>
+        <p:cNvPr id="1" name=""/>
+        <p:cNvGrpSpPr/>
+        <p:nvPr/>
+      </p:nvGrpSpPr>
+      <p:grpSpPr>
+        <a:xfrm>
+          <a:off x="0" y="0"/>
+          <a:ext cx="0" cy="0"/>
+          <a:chOff x="0" y="0"/>
+          <a:chExt cx="0" cy="0"/>
+        </a:xfrm>
+      </p:grpSpPr>
+      <p:sp>
+        <p:nvSpPr>
           <p:cNvPr id="12" name="Rectangle 11"/>
           <p:cNvSpPr/>
           <p:nvPr/>
@@ -4016,7 +4393,6 @@
               <a:rPr lang="en-US" sz="3200"/>
               <a:t>Finale</a:t>
             </a:r>
-            <a:endParaRPr lang="en-US" sz="3200"/>
           </a:p>
         </p:txBody>
       </p:sp>
@@ -4187,7 +4563,7 @@
 </p:sld>
 </file>
 
-<file path=ppt/slides/slide3.xml><?xml version="1.0" encoding="utf-8"?>
+<file path=ppt/slides/slide8.xml><?xml version="1.0" encoding="utf-8"?>
 <p:sld xmlns:a="http://schemas.openxmlformats.org/drawingml/2006/main" xmlns:r="http://schemas.openxmlformats.org/officeDocument/2006/relationships" xmlns:p="http://schemas.openxmlformats.org/presentationml/2006/main">
   <p:cSld>
     <p:spTree>
@@ -4579,7 +4955,7 @@
 </p:sld>
 </file>
 
-<file path=ppt/slides/slide4.xml><?xml version="1.0" encoding="utf-8"?>
+<file path=ppt/slides/slide9.xml><?xml version="1.0" encoding="utf-8"?>
 <p:sld xmlns:a="http://schemas.openxmlformats.org/drawingml/2006/main" xmlns:r="http://schemas.openxmlformats.org/officeDocument/2006/relationships" xmlns:p="http://schemas.openxmlformats.org/presentationml/2006/main">
   <p:cSld>
     <p:spTree>

</xml_diff>

<commit_message>
added slide for google analytic
</commit_message>
<xml_diff>
--- a/Documents/Présentation.pptx
+++ b/Documents/Présentation.pptx
@@ -14,6 +14,7 @@
     <p:sldId id="258" r:id="rId8"/>
     <p:sldId id="259" r:id="rId9"/>
     <p:sldId id="257" r:id="rId10"/>
+    <p:sldId id="265" r:id="rId11"/>
   </p:sldIdLst>
   <p:sldSz cx="9144000" cy="6858000" type="screen4x3"/>
   <p:notesSz cx="6858000" cy="9144000"/>
@@ -301,7 +302,7 @@
           <a:p>
             <a:fld id="{70BA1CFD-BFF0-48BC-9BA5-4974D7A6AB15}" type="datetimeFigureOut">
               <a:rPr lang="en-US" smtClean="0"/>
-              <a:t>15-04-09</a:t>
+              <a:t>15-04-11</a:t>
             </a:fld>
             <a:endParaRPr lang="en-US"/>
           </a:p>
@@ -658,7 +659,7 @@
           <a:p>
             <a:fld id="{70BA1CFD-BFF0-48BC-9BA5-4974D7A6AB15}" type="datetimeFigureOut">
               <a:rPr lang="en-US" smtClean="0"/>
-              <a:t>15-04-09</a:t>
+              <a:t>15-04-11</a:t>
             </a:fld>
             <a:endParaRPr lang="en-US"/>
           </a:p>
@@ -827,7 +828,7 @@
           <a:p>
             <a:fld id="{70BA1CFD-BFF0-48BC-9BA5-4974D7A6AB15}" type="datetimeFigureOut">
               <a:rPr lang="en-US" smtClean="0"/>
-              <a:t>15-04-09</a:t>
+              <a:t>15-04-11</a:t>
             </a:fld>
             <a:endParaRPr lang="en-US"/>
           </a:p>
@@ -1006,7 +1007,7 @@
           <a:p>
             <a:fld id="{70BA1CFD-BFF0-48BC-9BA5-4974D7A6AB15}" type="datetimeFigureOut">
               <a:rPr lang="en-US" smtClean="0"/>
-              <a:t>15-04-09</a:t>
+              <a:t>15-04-11</a:t>
             </a:fld>
             <a:endParaRPr lang="en-US"/>
           </a:p>
@@ -1175,7 +1176,7 @@
           <a:p>
             <a:fld id="{70BA1CFD-BFF0-48BC-9BA5-4974D7A6AB15}" type="datetimeFigureOut">
               <a:rPr lang="en-US" smtClean="0"/>
-              <a:t>15-04-09</a:t>
+              <a:t>15-04-11</a:t>
             </a:fld>
             <a:endParaRPr lang="en-US"/>
           </a:p>
@@ -1452,7 +1453,7 @@
           <a:p>
             <a:fld id="{70BA1CFD-BFF0-48BC-9BA5-4974D7A6AB15}" type="datetimeFigureOut">
               <a:rPr lang="en-US" smtClean="0"/>
-              <a:t>15-04-09</a:t>
+              <a:t>15-04-11</a:t>
             </a:fld>
             <a:endParaRPr lang="en-US"/>
           </a:p>
@@ -1744,7 +1745,7 @@
           <a:p>
             <a:fld id="{70BA1CFD-BFF0-48BC-9BA5-4974D7A6AB15}" type="datetimeFigureOut">
               <a:rPr lang="en-US" smtClean="0"/>
-              <a:t>15-04-09</a:t>
+              <a:t>15-04-11</a:t>
             </a:fld>
             <a:endParaRPr lang="en-US"/>
           </a:p>
@@ -2180,7 +2181,7 @@
           <a:p>
             <a:fld id="{70BA1CFD-BFF0-48BC-9BA5-4974D7A6AB15}" type="datetimeFigureOut">
               <a:rPr lang="en-US" smtClean="0"/>
-              <a:t>15-04-09</a:t>
+              <a:t>15-04-11</a:t>
             </a:fld>
             <a:endParaRPr lang="en-US"/>
           </a:p>
@@ -2293,7 +2294,7 @@
           <a:p>
             <a:fld id="{70BA1CFD-BFF0-48BC-9BA5-4974D7A6AB15}" type="datetimeFigureOut">
               <a:rPr lang="en-US" smtClean="0"/>
-              <a:t>15-04-09</a:t>
+              <a:t>15-04-11</a:t>
             </a:fld>
             <a:endParaRPr lang="en-US"/>
           </a:p>
@@ -2383,7 +2384,7 @@
           <a:p>
             <a:fld id="{70BA1CFD-BFF0-48BC-9BA5-4974D7A6AB15}" type="datetimeFigureOut">
               <a:rPr lang="en-US" smtClean="0"/>
-              <a:t>15-04-09</a:t>
+              <a:t>15-04-11</a:t>
             </a:fld>
             <a:endParaRPr lang="en-US"/>
           </a:p>
@@ -2720,7 +2721,7 @@
           <a:p>
             <a:fld id="{70BA1CFD-BFF0-48BC-9BA5-4974D7A6AB15}" type="datetimeFigureOut">
               <a:rPr lang="en-US" smtClean="0"/>
-              <a:t>15-04-09</a:t>
+              <a:t>15-04-11</a:t>
             </a:fld>
             <a:endParaRPr lang="en-US"/>
           </a:p>
@@ -3035,7 +3036,7 @@
           <a:p>
             <a:fld id="{70BA1CFD-BFF0-48BC-9BA5-4974D7A6AB15}" type="datetimeFigureOut">
               <a:rPr lang="en-US" smtClean="0"/>
-              <a:t>15-04-09</a:t>
+              <a:t>15-04-11</a:t>
             </a:fld>
             <a:endParaRPr lang="en-US"/>
           </a:p>
@@ -3281,7 +3282,7 @@
           <a:p>
             <a:fld id="{70BA1CFD-BFF0-48BC-9BA5-4974D7A6AB15}" type="datetimeFigureOut">
               <a:rPr lang="en-US" smtClean="0"/>
-              <a:t>15-04-09</a:t>
+              <a:t>15-04-11</a:t>
             </a:fld>
             <a:endParaRPr lang="en-US"/>
           </a:p>
@@ -3828,6 +3829,89 @@
 </p:sld>
 </file>
 
+<file path=ppt/slides/slide10.xml><?xml version="1.0" encoding="utf-8"?>
+<p:sld xmlns:a="http://schemas.openxmlformats.org/drawingml/2006/main" xmlns:r="http://schemas.openxmlformats.org/officeDocument/2006/relationships" xmlns:p="http://schemas.openxmlformats.org/presentationml/2006/main">
+  <p:cSld>
+    <p:spTree>
+      <p:nvGrpSpPr>
+        <p:cNvPr id="1" name=""/>
+        <p:cNvGrpSpPr/>
+        <p:nvPr/>
+      </p:nvGrpSpPr>
+      <p:grpSpPr>
+        <a:xfrm>
+          <a:off x="0" y="0"/>
+          <a:ext cx="0" cy="0"/>
+          <a:chOff x="0" y="0"/>
+          <a:chExt cx="0" cy="0"/>
+        </a:xfrm>
+      </p:grpSpPr>
+      <p:sp>
+        <p:nvSpPr>
+          <p:cNvPr id="2" name="Title 1"/>
+          <p:cNvSpPr>
+            <a:spLocks noGrp="1"/>
+          </p:cNvSpPr>
+          <p:nvPr>
+            <p:ph type="title"/>
+          </p:nvPr>
+        </p:nvSpPr>
+        <p:spPr/>
+        <p:txBody>
+          <a:bodyPr/>
+          <a:lstStyle/>
+          <a:p>
+            <a:r>
+              <a:rPr lang="en-US"/>
+              <a:t>Google Analytic</a:t>
+            </a:r>
+          </a:p>
+        </p:txBody>
+      </p:sp>
+      <p:pic>
+        <p:nvPicPr>
+          <p:cNvPr id="4" name="Content Placeholder 3"/>
+          <p:cNvPicPr>
+            <a:picLocks noGrp="1"/>
+          </p:cNvPicPr>
+          <p:nvPr>
+            <p:ph idx="1"/>
+          </p:nvPr>
+        </p:nvPicPr>
+        <p:blipFill rotWithShape="1">
+          <a:blip r:embed="rId2">
+            <a:extLst>
+              <a:ext uri="{28A0092B-C50C-407E-A947-70E740481C1C}">
+                <a14:useLocalDpi xmlns:a14="http://schemas.microsoft.com/office/drawing/2010/main" val="0"/>
+              </a:ext>
+            </a:extLst>
+          </a:blip>
+          <a:srcRect l="-14882" r="-10878" b="1702"/>
+          <a:stretch/>
+        </p:blipFill>
+        <p:spPr bwMode="auto">
+          <a:prstGeom prst="rect">
+            <a:avLst/>
+          </a:prstGeom>
+          <a:noFill/>
+          <a:ln>
+            <a:noFill/>
+          </a:ln>
+        </p:spPr>
+      </p:pic>
+    </p:spTree>
+    <p:extLst>
+      <p:ext uri="{BB962C8B-B14F-4D97-AF65-F5344CB8AC3E}">
+        <p14:creationId xmlns:p14="http://schemas.microsoft.com/office/powerpoint/2010/main" val="92573257"/>
+      </p:ext>
+    </p:extLst>
+  </p:cSld>
+  <p:clrMapOvr>
+    <a:masterClrMapping/>
+  </p:clrMapOvr>
+</p:sld>
+</file>
+
 <file path=ppt/slides/slide2.xml><?xml version="1.0" encoding="utf-8"?>
 <p:sld xmlns:a="http://schemas.openxmlformats.org/drawingml/2006/main" xmlns:r="http://schemas.openxmlformats.org/officeDocument/2006/relationships" xmlns:p="http://schemas.openxmlformats.org/presentationml/2006/main">
   <p:cSld>

</xml_diff>